<commit_message>
Updated final ppt with the comparison image
</commit_message>
<xml_diff>
--- a/images_pvis/data-char.pptx
+++ b/images_pvis/data-char.pptx
@@ -4,6 +4,9 @@
   <p:sldMasterIdLst>
     <p:sldMasterId id="2147483708" r:id="rId1"/>
   </p:sldMasterIdLst>
+  <p:notesMasterIdLst>
+    <p:notesMasterId r:id="rId3"/>
+  </p:notesMasterIdLst>
   <p:sldIdLst>
     <p:sldId id="256" r:id="rId2"/>
   </p:sldIdLst>
@@ -107,6 +110,440 @@
 </p:presentation>
 </file>
 
+<file path=ppt/notesMasters/notesMaster1.xml><?xml version="1.0" encoding="utf-8"?>
+<p:notesMaster xmlns:a="http://schemas.openxmlformats.org/drawingml/2006/main" xmlns:r="http://schemas.openxmlformats.org/officeDocument/2006/relationships" xmlns:p="http://schemas.openxmlformats.org/presentationml/2006/main">
+  <p:cSld>
+    <p:bg>
+      <p:bgRef idx="1001">
+        <a:schemeClr val="bg1"/>
+      </p:bgRef>
+    </p:bg>
+    <p:spTree>
+      <p:nvGrpSpPr>
+        <p:cNvPr id="1" name=""/>
+        <p:cNvGrpSpPr/>
+        <p:nvPr/>
+      </p:nvGrpSpPr>
+      <p:grpSpPr>
+        <a:xfrm>
+          <a:off x="0" y="0"/>
+          <a:ext cx="0" cy="0"/>
+          <a:chOff x="0" y="0"/>
+          <a:chExt cx="0" cy="0"/>
+        </a:xfrm>
+      </p:grpSpPr>
+      <p:sp>
+        <p:nvSpPr>
+          <p:cNvPr id="2" name="Header Placeholder 1"/>
+          <p:cNvSpPr>
+            <a:spLocks noGrp="1"/>
+          </p:cNvSpPr>
+          <p:nvPr>
+            <p:ph type="hdr" sz="quarter"/>
+          </p:nvPr>
+        </p:nvSpPr>
+        <p:spPr>
+          <a:xfrm>
+            <a:off x="0" y="0"/>
+            <a:ext cx="2971800" cy="457200"/>
+          </a:xfrm>
+          <a:prstGeom prst="rect">
+            <a:avLst/>
+          </a:prstGeom>
+        </p:spPr>
+        <p:txBody>
+          <a:bodyPr vert="horz" lIns="91440" tIns="45720" rIns="91440" bIns="45720" rtlCol="0"/>
+          <a:lstStyle>
+            <a:lvl1pPr algn="l">
+              <a:defRPr sz="1200"/>
+            </a:lvl1pPr>
+          </a:lstStyle>
+          <a:p>
+            <a:endParaRPr lang="en-US"/>
+          </a:p>
+        </p:txBody>
+      </p:sp>
+      <p:sp>
+        <p:nvSpPr>
+          <p:cNvPr id="3" name="Date Placeholder 2"/>
+          <p:cNvSpPr>
+            <a:spLocks noGrp="1"/>
+          </p:cNvSpPr>
+          <p:nvPr>
+            <p:ph type="dt" idx="1"/>
+          </p:nvPr>
+        </p:nvSpPr>
+        <p:spPr>
+          <a:xfrm>
+            <a:off x="3884613" y="0"/>
+            <a:ext cx="2971800" cy="457200"/>
+          </a:xfrm>
+          <a:prstGeom prst="rect">
+            <a:avLst/>
+          </a:prstGeom>
+        </p:spPr>
+        <p:txBody>
+          <a:bodyPr vert="horz" lIns="91440" tIns="45720" rIns="91440" bIns="45720" rtlCol="0"/>
+          <a:lstStyle>
+            <a:lvl1pPr algn="r">
+              <a:defRPr sz="1200"/>
+            </a:lvl1pPr>
+          </a:lstStyle>
+          <a:p>
+            <a:fld id="{664518E8-0F05-4082-AC33-2465F1DCE6FF}" type="datetimeFigureOut">
+              <a:rPr lang="en-US" smtClean="0"/>
+              <a:t>9/24/2014</a:t>
+            </a:fld>
+            <a:endParaRPr lang="en-US"/>
+          </a:p>
+        </p:txBody>
+      </p:sp>
+      <p:sp>
+        <p:nvSpPr>
+          <p:cNvPr id="4" name="Slide Image Placeholder 3"/>
+          <p:cNvSpPr>
+            <a:spLocks noGrp="1" noRot="1" noChangeAspect="1"/>
+          </p:cNvSpPr>
+          <p:nvPr>
+            <p:ph type="sldImg" idx="2"/>
+          </p:nvPr>
+        </p:nvSpPr>
+        <p:spPr>
+          <a:xfrm>
+            <a:off x="1216025" y="685800"/>
+            <a:ext cx="4425950" cy="3429000"/>
+          </a:xfrm>
+          <a:prstGeom prst="rect">
+            <a:avLst/>
+          </a:prstGeom>
+          <a:noFill/>
+          <a:ln w="12700">
+            <a:solidFill>
+              <a:prstClr val="black"/>
+            </a:solidFill>
+          </a:ln>
+        </p:spPr>
+        <p:txBody>
+          <a:bodyPr vert="horz" lIns="91440" tIns="45720" rIns="91440" bIns="45720" rtlCol="0" anchor="ctr"/>
+          <a:lstStyle/>
+          <a:p>
+            <a:endParaRPr lang="en-US"/>
+          </a:p>
+        </p:txBody>
+      </p:sp>
+      <p:sp>
+        <p:nvSpPr>
+          <p:cNvPr id="5" name="Notes Placeholder 4"/>
+          <p:cNvSpPr>
+            <a:spLocks noGrp="1"/>
+          </p:cNvSpPr>
+          <p:nvPr>
+            <p:ph type="body" sz="quarter" idx="3"/>
+          </p:nvPr>
+        </p:nvSpPr>
+        <p:spPr>
+          <a:xfrm>
+            <a:off x="685800" y="4343400"/>
+            <a:ext cx="5486400" cy="4114800"/>
+          </a:xfrm>
+          <a:prstGeom prst="rect">
+            <a:avLst/>
+          </a:prstGeom>
+        </p:spPr>
+        <p:txBody>
+          <a:bodyPr vert="horz" lIns="91440" tIns="45720" rIns="91440" bIns="45720" rtlCol="0"/>
+          <a:lstStyle/>
+          <a:p>
+            <a:pPr lvl="0"/>
+            <a:r>
+              <a:rPr lang="en-US" smtClean="0"/>
+              <a:t>Click to edit Master text styles</a:t>
+            </a:r>
+          </a:p>
+          <a:p>
+            <a:pPr lvl="1"/>
+            <a:r>
+              <a:rPr lang="en-US" smtClean="0"/>
+              <a:t>Second level</a:t>
+            </a:r>
+          </a:p>
+          <a:p>
+            <a:pPr lvl="2"/>
+            <a:r>
+              <a:rPr lang="en-US" smtClean="0"/>
+              <a:t>Third level</a:t>
+            </a:r>
+          </a:p>
+          <a:p>
+            <a:pPr lvl="3"/>
+            <a:r>
+              <a:rPr lang="en-US" smtClean="0"/>
+              <a:t>Fourth level</a:t>
+            </a:r>
+          </a:p>
+          <a:p>
+            <a:pPr lvl="4"/>
+            <a:r>
+              <a:rPr lang="en-US" smtClean="0"/>
+              <a:t>Fifth level</a:t>
+            </a:r>
+            <a:endParaRPr lang="en-US"/>
+          </a:p>
+        </p:txBody>
+      </p:sp>
+      <p:sp>
+        <p:nvSpPr>
+          <p:cNvPr id="6" name="Footer Placeholder 5"/>
+          <p:cNvSpPr>
+            <a:spLocks noGrp="1"/>
+          </p:cNvSpPr>
+          <p:nvPr>
+            <p:ph type="ftr" sz="quarter" idx="4"/>
+          </p:nvPr>
+        </p:nvSpPr>
+        <p:spPr>
+          <a:xfrm>
+            <a:off x="0" y="8685213"/>
+            <a:ext cx="2971800" cy="457200"/>
+          </a:xfrm>
+          <a:prstGeom prst="rect">
+            <a:avLst/>
+          </a:prstGeom>
+        </p:spPr>
+        <p:txBody>
+          <a:bodyPr vert="horz" lIns="91440" tIns="45720" rIns="91440" bIns="45720" rtlCol="0" anchor="b"/>
+          <a:lstStyle>
+            <a:lvl1pPr algn="l">
+              <a:defRPr sz="1200"/>
+            </a:lvl1pPr>
+          </a:lstStyle>
+          <a:p>
+            <a:endParaRPr lang="en-US"/>
+          </a:p>
+        </p:txBody>
+      </p:sp>
+      <p:sp>
+        <p:nvSpPr>
+          <p:cNvPr id="7" name="Slide Number Placeholder 6"/>
+          <p:cNvSpPr>
+            <a:spLocks noGrp="1"/>
+          </p:cNvSpPr>
+          <p:nvPr>
+            <p:ph type="sldNum" sz="quarter" idx="5"/>
+          </p:nvPr>
+        </p:nvSpPr>
+        <p:spPr>
+          <a:xfrm>
+            <a:off x="3884613" y="8685213"/>
+            <a:ext cx="2971800" cy="457200"/>
+          </a:xfrm>
+          <a:prstGeom prst="rect">
+            <a:avLst/>
+          </a:prstGeom>
+        </p:spPr>
+        <p:txBody>
+          <a:bodyPr vert="horz" lIns="91440" tIns="45720" rIns="91440" bIns="45720" rtlCol="0" anchor="b"/>
+          <a:lstStyle>
+            <a:lvl1pPr algn="r">
+              <a:defRPr sz="1200"/>
+            </a:lvl1pPr>
+          </a:lstStyle>
+          <a:p>
+            <a:fld id="{9B6F9AD6-FF45-402F-90D5-27CCCEEBC2E4}" type="slidenum">
+              <a:rPr lang="en-US" smtClean="0"/>
+              <a:t>‹#›</a:t>
+            </a:fld>
+            <a:endParaRPr lang="en-US"/>
+          </a:p>
+        </p:txBody>
+      </p:sp>
+    </p:spTree>
+    <p:extLst>
+      <p:ext uri="{BB962C8B-B14F-4D97-AF65-F5344CB8AC3E}">
+        <p14:creationId xmlns:p14="http://schemas.microsoft.com/office/powerpoint/2010/main" val="838809748"/>
+      </p:ext>
+    </p:extLst>
+  </p:cSld>
+  <p:clrMap bg1="lt1" tx1="dk1" bg2="lt2" tx2="dk2" accent1="accent1" accent2="accent2" accent3="accent3" accent4="accent4" accent5="accent5" accent6="accent6" hlink="hlink" folHlink="folHlink"/>
+  <p:notesStyle>
+    <a:lvl1pPr marL="0" algn="l" defTabSz="914400" rtl="0" eaLnBrk="1" latinLnBrk="0" hangingPunct="1">
+      <a:defRPr sz="1200" kern="1200">
+        <a:solidFill>
+          <a:schemeClr val="tx1"/>
+        </a:solidFill>
+        <a:latin typeface="+mn-lt"/>
+        <a:ea typeface="+mn-ea"/>
+        <a:cs typeface="+mn-cs"/>
+      </a:defRPr>
+    </a:lvl1pPr>
+    <a:lvl2pPr marL="457200" algn="l" defTabSz="914400" rtl="0" eaLnBrk="1" latinLnBrk="0" hangingPunct="1">
+      <a:defRPr sz="1200" kern="1200">
+        <a:solidFill>
+          <a:schemeClr val="tx1"/>
+        </a:solidFill>
+        <a:latin typeface="+mn-lt"/>
+        <a:ea typeface="+mn-ea"/>
+        <a:cs typeface="+mn-cs"/>
+      </a:defRPr>
+    </a:lvl2pPr>
+    <a:lvl3pPr marL="914400" algn="l" defTabSz="914400" rtl="0" eaLnBrk="1" latinLnBrk="0" hangingPunct="1">
+      <a:defRPr sz="1200" kern="1200">
+        <a:solidFill>
+          <a:schemeClr val="tx1"/>
+        </a:solidFill>
+        <a:latin typeface="+mn-lt"/>
+        <a:ea typeface="+mn-ea"/>
+        <a:cs typeface="+mn-cs"/>
+      </a:defRPr>
+    </a:lvl3pPr>
+    <a:lvl4pPr marL="1371600" algn="l" defTabSz="914400" rtl="0" eaLnBrk="1" latinLnBrk="0" hangingPunct="1">
+      <a:defRPr sz="1200" kern="1200">
+        <a:solidFill>
+          <a:schemeClr val="tx1"/>
+        </a:solidFill>
+        <a:latin typeface="+mn-lt"/>
+        <a:ea typeface="+mn-ea"/>
+        <a:cs typeface="+mn-cs"/>
+      </a:defRPr>
+    </a:lvl4pPr>
+    <a:lvl5pPr marL="1828800" algn="l" defTabSz="914400" rtl="0" eaLnBrk="1" latinLnBrk="0" hangingPunct="1">
+      <a:defRPr sz="1200" kern="1200">
+        <a:solidFill>
+          <a:schemeClr val="tx1"/>
+        </a:solidFill>
+        <a:latin typeface="+mn-lt"/>
+        <a:ea typeface="+mn-ea"/>
+        <a:cs typeface="+mn-cs"/>
+      </a:defRPr>
+    </a:lvl5pPr>
+    <a:lvl6pPr marL="2286000" algn="l" defTabSz="914400" rtl="0" eaLnBrk="1" latinLnBrk="0" hangingPunct="1">
+      <a:defRPr sz="1200" kern="1200">
+        <a:solidFill>
+          <a:schemeClr val="tx1"/>
+        </a:solidFill>
+        <a:latin typeface="+mn-lt"/>
+        <a:ea typeface="+mn-ea"/>
+        <a:cs typeface="+mn-cs"/>
+      </a:defRPr>
+    </a:lvl6pPr>
+    <a:lvl7pPr marL="2743200" algn="l" defTabSz="914400" rtl="0" eaLnBrk="1" latinLnBrk="0" hangingPunct="1">
+      <a:defRPr sz="1200" kern="1200">
+        <a:solidFill>
+          <a:schemeClr val="tx1"/>
+        </a:solidFill>
+        <a:latin typeface="+mn-lt"/>
+        <a:ea typeface="+mn-ea"/>
+        <a:cs typeface="+mn-cs"/>
+      </a:defRPr>
+    </a:lvl7pPr>
+    <a:lvl8pPr marL="3200400" algn="l" defTabSz="914400" rtl="0" eaLnBrk="1" latinLnBrk="0" hangingPunct="1">
+      <a:defRPr sz="1200" kern="1200">
+        <a:solidFill>
+          <a:schemeClr val="tx1"/>
+        </a:solidFill>
+        <a:latin typeface="+mn-lt"/>
+        <a:ea typeface="+mn-ea"/>
+        <a:cs typeface="+mn-cs"/>
+      </a:defRPr>
+    </a:lvl8pPr>
+    <a:lvl9pPr marL="3657600" algn="l" defTabSz="914400" rtl="0" eaLnBrk="1" latinLnBrk="0" hangingPunct="1">
+      <a:defRPr sz="1200" kern="1200">
+        <a:solidFill>
+          <a:schemeClr val="tx1"/>
+        </a:solidFill>
+        <a:latin typeface="+mn-lt"/>
+        <a:ea typeface="+mn-ea"/>
+        <a:cs typeface="+mn-cs"/>
+      </a:defRPr>
+    </a:lvl9pPr>
+  </p:notesStyle>
+</p:notesMaster>
+</file>
+
+<file path=ppt/notesSlides/notesSlide1.xml><?xml version="1.0" encoding="utf-8"?>
+<p:notes xmlns:a="http://schemas.openxmlformats.org/drawingml/2006/main" xmlns:r="http://schemas.openxmlformats.org/officeDocument/2006/relationships" xmlns:p="http://schemas.openxmlformats.org/presentationml/2006/main">
+  <p:cSld>
+    <p:spTree>
+      <p:nvGrpSpPr>
+        <p:cNvPr id="1" name=""/>
+        <p:cNvGrpSpPr/>
+        <p:nvPr/>
+      </p:nvGrpSpPr>
+      <p:grpSpPr>
+        <a:xfrm>
+          <a:off x="0" y="0"/>
+          <a:ext cx="0" cy="0"/>
+          <a:chOff x="0" y="0"/>
+          <a:chExt cx="0" cy="0"/>
+        </a:xfrm>
+      </p:grpSpPr>
+      <p:sp>
+        <p:nvSpPr>
+          <p:cNvPr id="2" name="Slide Image Placeholder 1"/>
+          <p:cNvSpPr>
+            <a:spLocks noGrp="1" noRot="1" noChangeAspect="1"/>
+          </p:cNvSpPr>
+          <p:nvPr>
+            <p:ph type="sldImg"/>
+          </p:nvPr>
+        </p:nvSpPr>
+        <p:spPr/>
+      </p:sp>
+      <p:sp>
+        <p:nvSpPr>
+          <p:cNvPr id="3" name="Notes Placeholder 2"/>
+          <p:cNvSpPr>
+            <a:spLocks noGrp="1"/>
+          </p:cNvSpPr>
+          <p:nvPr>
+            <p:ph type="body" idx="1"/>
+          </p:nvPr>
+        </p:nvSpPr>
+        <p:spPr/>
+        <p:txBody>
+          <a:bodyPr/>
+          <a:lstStyle/>
+          <a:p>
+            <a:endParaRPr lang="en-US"/>
+          </a:p>
+        </p:txBody>
+      </p:sp>
+      <p:sp>
+        <p:nvSpPr>
+          <p:cNvPr id="4" name="Slide Number Placeholder 3"/>
+          <p:cNvSpPr>
+            <a:spLocks noGrp="1"/>
+          </p:cNvSpPr>
+          <p:nvPr>
+            <p:ph type="sldNum" sz="quarter" idx="10"/>
+          </p:nvPr>
+        </p:nvSpPr>
+        <p:spPr/>
+        <p:txBody>
+          <a:bodyPr/>
+          <a:lstStyle/>
+          <a:p>
+            <a:fld id="{9B6F9AD6-FF45-402F-90D5-27CCCEEBC2E4}" type="slidenum">
+              <a:rPr lang="en-US" smtClean="0"/>
+              <a:t>1</a:t>
+            </a:fld>
+            <a:endParaRPr lang="en-US"/>
+          </a:p>
+        </p:txBody>
+      </p:sp>
+    </p:spTree>
+    <p:extLst>
+      <p:ext uri="{BB962C8B-B14F-4D97-AF65-F5344CB8AC3E}">
+        <p14:creationId xmlns:p14="http://schemas.microsoft.com/office/powerpoint/2010/main" val="2151733533"/>
+      </p:ext>
+    </p:extLst>
+  </p:cSld>
+  <p:clrMapOvr>
+    <a:masterClrMapping/>
+  </p:clrMapOvr>
+</p:notes>
+</file>
+
 <file path=ppt/slideLayouts/slideLayout1.xml><?xml version="1.0" encoding="utf-8"?>
 <p:sldLayout xmlns:a="http://schemas.openxmlformats.org/drawingml/2006/main" xmlns:r="http://schemas.openxmlformats.org/officeDocument/2006/relationships" xmlns:p="http://schemas.openxmlformats.org/presentationml/2006/main" type="title" preserve="1">
   <p:cSld name="Title Slide">
@@ -238,7 +675,7 @@
           <a:p>
             <a:fld id="{D5733D75-C1E6-43FA-A4C1-CB390108D22E}" type="datetimeFigureOut">
               <a:rPr lang="en-US" smtClean="0"/>
-              <a:t>9/25/2014</a:t>
+              <a:t>9/24/2014</a:t>
             </a:fld>
             <a:endParaRPr lang="en-US"/>
           </a:p>
@@ -408,7 +845,7 @@
           <a:p>
             <a:fld id="{D5733D75-C1E6-43FA-A4C1-CB390108D22E}" type="datetimeFigureOut">
               <a:rPr lang="en-US" smtClean="0"/>
-              <a:t>9/25/2014</a:t>
+              <a:t>9/24/2014</a:t>
             </a:fld>
             <a:endParaRPr lang="en-US"/>
           </a:p>
@@ -588,7 +1025,7 @@
           <a:p>
             <a:fld id="{D5733D75-C1E6-43FA-A4C1-CB390108D22E}" type="datetimeFigureOut">
               <a:rPr lang="en-US" smtClean="0"/>
-              <a:t>9/25/2014</a:t>
+              <a:t>9/24/2014</a:t>
             </a:fld>
             <a:endParaRPr lang="en-US"/>
           </a:p>
@@ -758,7 +1195,7 @@
           <a:p>
             <a:fld id="{D5733D75-C1E6-43FA-A4C1-CB390108D22E}" type="datetimeFigureOut">
               <a:rPr lang="en-US" smtClean="0"/>
-              <a:t>9/25/2014</a:t>
+              <a:t>9/24/2014</a:t>
             </a:fld>
             <a:endParaRPr lang="en-US"/>
           </a:p>
@@ -1002,7 +1439,7 @@
           <a:p>
             <a:fld id="{D5733D75-C1E6-43FA-A4C1-CB390108D22E}" type="datetimeFigureOut">
               <a:rPr lang="en-US" smtClean="0"/>
-              <a:t>9/25/2014</a:t>
+              <a:t>9/24/2014</a:t>
             </a:fld>
             <a:endParaRPr lang="en-US"/>
           </a:p>
@@ -1234,7 +1671,7 @@
           <a:p>
             <a:fld id="{D5733D75-C1E6-43FA-A4C1-CB390108D22E}" type="datetimeFigureOut">
               <a:rPr lang="en-US" smtClean="0"/>
-              <a:t>9/25/2014</a:t>
+              <a:t>9/24/2014</a:t>
             </a:fld>
             <a:endParaRPr lang="en-US"/>
           </a:p>
@@ -1601,7 +2038,7 @@
           <a:p>
             <a:fld id="{D5733D75-C1E6-43FA-A4C1-CB390108D22E}" type="datetimeFigureOut">
               <a:rPr lang="en-US" smtClean="0"/>
-              <a:t>9/25/2014</a:t>
+              <a:t>9/24/2014</a:t>
             </a:fld>
             <a:endParaRPr lang="en-US"/>
           </a:p>
@@ -1719,7 +2156,7 @@
           <a:p>
             <a:fld id="{D5733D75-C1E6-43FA-A4C1-CB390108D22E}" type="datetimeFigureOut">
               <a:rPr lang="en-US" smtClean="0"/>
-              <a:t>9/25/2014</a:t>
+              <a:t>9/24/2014</a:t>
             </a:fld>
             <a:endParaRPr lang="en-US"/>
           </a:p>
@@ -1814,7 +2251,7 @@
           <a:p>
             <a:fld id="{D5733D75-C1E6-43FA-A4C1-CB390108D22E}" type="datetimeFigureOut">
               <a:rPr lang="en-US" smtClean="0"/>
-              <a:t>9/25/2014</a:t>
+              <a:t>9/24/2014</a:t>
             </a:fld>
             <a:endParaRPr lang="en-US"/>
           </a:p>
@@ -2091,7 +2528,7 @@
           <a:p>
             <a:fld id="{D5733D75-C1E6-43FA-A4C1-CB390108D22E}" type="datetimeFigureOut">
               <a:rPr lang="en-US" smtClean="0"/>
-              <a:t>9/25/2014</a:t>
+              <a:t>9/24/2014</a:t>
             </a:fld>
             <a:endParaRPr lang="en-US"/>
           </a:p>
@@ -2348,7 +2785,7 @@
           <a:p>
             <a:fld id="{D5733D75-C1E6-43FA-A4C1-CB390108D22E}" type="datetimeFigureOut">
               <a:rPr lang="en-US" smtClean="0"/>
-              <a:t>9/25/2014</a:t>
+              <a:t>9/24/2014</a:t>
             </a:fld>
             <a:endParaRPr lang="en-US"/>
           </a:p>
@@ -2561,7 +2998,7 @@
           <a:p>
             <a:fld id="{D5733D75-C1E6-43FA-A4C1-CB390108D22E}" type="datetimeFigureOut">
               <a:rPr lang="en-US" smtClean="0"/>
-              <a:t>9/25/2014</a:t>
+              <a:t>9/24/2014</a:t>
             </a:fld>
             <a:endParaRPr lang="en-US"/>
           </a:p>
@@ -2991,7 +3428,7 @@
             <p:nvPr/>
           </p:nvPicPr>
           <p:blipFill>
-            <a:blip r:embed="rId2">
+            <a:blip r:embed="rId3">
               <a:extLst>
                 <a:ext uri="{28A0092B-C50C-407E-A947-70E740481C1C}">
                   <a14:useLocalDpi xmlns:a14="http://schemas.microsoft.com/office/drawing/2010/main" val="0"/>
@@ -3021,7 +3458,7 @@
             <p:nvPr/>
           </p:nvPicPr>
           <p:blipFill>
-            <a:blip r:embed="rId3">
+            <a:blip r:embed="rId4">
               <a:extLst>
                 <a:ext uri="{28A0092B-C50C-407E-A947-70E740481C1C}">
                   <a14:useLocalDpi xmlns:a14="http://schemas.microsoft.com/office/drawing/2010/main" val="0"/>
@@ -3056,7 +3493,7 @@
             <p:nvPr/>
           </p:nvPicPr>
           <p:blipFill>
-            <a:blip r:embed="rId4">
+            <a:blip r:embed="rId5">
               <a:extLst>
                 <a:ext uri="{28A0092B-C50C-407E-A947-70E740481C1C}">
                   <a14:useLocalDpi xmlns:a14="http://schemas.microsoft.com/office/drawing/2010/main" val="0"/>
@@ -3091,7 +3528,7 @@
             <p:nvPr/>
           </p:nvPicPr>
           <p:blipFill>
-            <a:blip r:embed="rId5">
+            <a:blip r:embed="rId6">
               <a:extLst>
                 <a:ext uri="{28A0092B-C50C-407E-A947-70E740481C1C}">
                   <a14:useLocalDpi xmlns:a14="http://schemas.microsoft.com/office/drawing/2010/main" val="0"/>
@@ -3381,7 +3818,6 @@
                 <a:rPr lang="en-US" sz="5820" dirty="0"/>
                 <a:t>b</a:t>
               </a:r>
-              <a:endParaRPr lang="en-US" sz="5820" dirty="0"/>
             </a:p>
           </p:txBody>
         </p:sp>
@@ -3449,10 +3885,10 @@
           </p:nvGrpSpPr>
           <p:grpSpPr>
             <a:xfrm>
-              <a:off x="877184" y="1477435"/>
-              <a:ext cx="8685129" cy="5653603"/>
-              <a:chOff x="877184" y="1477435"/>
-              <a:chExt cx="8685129" cy="5653603"/>
+              <a:off x="903965" y="1222978"/>
+              <a:ext cx="8658348" cy="5908060"/>
+              <a:chOff x="903965" y="1222978"/>
+              <a:chExt cx="8658348" cy="5908060"/>
             </a:xfrm>
           </p:grpSpPr>
           <p:cxnSp>
@@ -3607,8 +4043,8 @@
             </p:nvSpPr>
             <p:spPr>
               <a:xfrm rot="585327">
-                <a:off x="877184" y="1477435"/>
-                <a:ext cx="2180017" cy="666916"/>
+                <a:off x="903965" y="1222978"/>
+                <a:ext cx="2873957" cy="923529"/>
               </a:xfrm>
               <a:prstGeom prst="rect">
                 <a:avLst/>
@@ -3628,12 +4064,8 @@
               <a:lstStyle/>
               <a:p>
                 <a:r>
-                  <a:rPr lang="en-US" sz="3638" dirty="0"/>
-                  <a:t>X Y </a:t>
-                </a:r>
-                <a:r>
-                  <a:rPr lang="en-US" sz="3638" dirty="0"/>
-                  <a:t>Plane</a:t>
+                  <a:rPr lang="en-US" sz="5400" dirty="0"/>
+                  <a:t>X Y Plane</a:t>
                 </a:r>
               </a:p>
             </p:txBody>
@@ -3648,7 +4080,7 @@
           <p:spPr>
             <a:xfrm>
               <a:off x="5844284" y="51355"/>
-              <a:ext cx="2897529" cy="652307"/>
+              <a:ext cx="2897529" cy="985097"/>
             </a:xfrm>
             <a:prstGeom prst="rect">
               <a:avLst/>
@@ -3665,7 +4097,7 @@
             <a:p>
               <a:pPr algn="ctr"/>
               <a:r>
-                <a:rPr lang="en-US" sz="3638" dirty="0"/>
+                <a:rPr lang="en-US" sz="5800" dirty="0"/>
                 <a:t>Y Z Plane</a:t>
               </a:r>
             </a:p>
@@ -3701,11 +4133,6 @@
                 </a:rPr>
                 <a:t>X axis</a:t>
               </a:r>
-              <a:endParaRPr lang="en-US" sz="1821" b="1" dirty="0">
-                <a:solidFill>
-                  <a:srgbClr val="E70000"/>
-                </a:solidFill>
-              </a:endParaRPr>
             </a:p>
           </p:txBody>
         </p:sp>
@@ -3871,7 +4298,7 @@
               <p:nvPr/>
             </p:nvPicPr>
             <p:blipFill>
-              <a:blip r:embed="rId6">
+              <a:blip r:embed="rId7">
                 <a:extLst>
                   <a:ext uri="{28A0092B-C50C-407E-A947-70E740481C1C}">
                     <a14:useLocalDpi xmlns:a14="http://schemas.microsoft.com/office/drawing/2010/main" val="0"/>
@@ -3950,7 +4377,6 @@
                   <a:rPr lang="en-US" sz="5820" dirty="0"/>
                   <a:t>d</a:t>
                 </a:r>
-                <a:endParaRPr lang="en-US" sz="5820" dirty="0"/>
               </a:p>
             </p:txBody>
           </p:sp>
@@ -4014,6 +4440,13 @@
   <p:clrMapOvr>
     <a:masterClrMapping/>
   </p:clrMapOvr>
+  <p:timing>
+    <p:tnLst>
+      <p:par>
+        <p:cTn id="1" dur="indefinite" restart="never" nodeType="tmRoot"/>
+      </p:par>
+    </p:tnLst>
+  </p:timing>
 </p:sld>
 </file>
 
@@ -4272,8 +4705,293 @@
   <a:extraClrSchemeLst/>
   <a:extLst>
     <a:ext uri="{05A4C25C-085E-4340-85A3-A5531E510DB2}">
-      <thm15:themeFamily xmlns:thm15="http://schemas.microsoft.com/office/thememl/2012/main" name="Office Theme" id="{62F939B6-93AF-4DB8-9C6B-D6C7DFDC589F}" vid="{4A3C46E8-61CC-4603-A589-7422A47A8E4A}"/>
+      <thm15:themeFamily xmlns="" xmlns:thm15="http://schemas.microsoft.com/office/thememl/2012/main" name="Office Theme" id="{62F939B6-93AF-4DB8-9C6B-D6C7DFDC589F}" vid="{4A3C46E8-61CC-4603-A589-7422A47A8E4A}"/>
     </a:ext>
   </a:extLst>
 </a:theme>
+</file>
+
+<file path=ppt/theme/theme2.xml><?xml version="1.0" encoding="utf-8"?>
+<a:theme xmlns:a="http://schemas.openxmlformats.org/drawingml/2006/main" name="Office Theme">
+  <a:themeElements>
+    <a:clrScheme name="Office">
+      <a:dk1>
+        <a:sysClr val="windowText" lastClr="000000"/>
+      </a:dk1>
+      <a:lt1>
+        <a:sysClr val="window" lastClr="FFFFFF"/>
+      </a:lt1>
+      <a:dk2>
+        <a:srgbClr val="1F497D"/>
+      </a:dk2>
+      <a:lt2>
+        <a:srgbClr val="EEECE1"/>
+      </a:lt2>
+      <a:accent1>
+        <a:srgbClr val="4F81BD"/>
+      </a:accent1>
+      <a:accent2>
+        <a:srgbClr val="C0504D"/>
+      </a:accent2>
+      <a:accent3>
+        <a:srgbClr val="9BBB59"/>
+      </a:accent3>
+      <a:accent4>
+        <a:srgbClr val="8064A2"/>
+      </a:accent4>
+      <a:accent5>
+        <a:srgbClr val="4BACC6"/>
+      </a:accent5>
+      <a:accent6>
+        <a:srgbClr val="F79646"/>
+      </a:accent6>
+      <a:hlink>
+        <a:srgbClr val="0000FF"/>
+      </a:hlink>
+      <a:folHlink>
+        <a:srgbClr val="800080"/>
+      </a:folHlink>
+    </a:clrScheme>
+    <a:fontScheme name="Office">
+      <a:majorFont>
+        <a:latin typeface="Calibri"/>
+        <a:ea typeface=""/>
+        <a:cs typeface=""/>
+        <a:font script="Jpan" typeface="ＭＳ Ｐゴシック"/>
+        <a:font script="Hang" typeface="맑은 고딕"/>
+        <a:font script="Hans" typeface="宋体"/>
+        <a:font script="Hant" typeface="新細明體"/>
+        <a:font script="Arab" typeface="Times New Roman"/>
+        <a:font script="Hebr" typeface="Times New Roman"/>
+        <a:font script="Thai" typeface="Angsana New"/>
+        <a:font script="Ethi" typeface="Nyala"/>
+        <a:font script="Beng" typeface="Vrinda"/>
+        <a:font script="Gujr" typeface="Shruti"/>
+        <a:font script="Khmr" typeface="MoolBoran"/>
+        <a:font script="Knda" typeface="Tunga"/>
+        <a:font script="Guru" typeface="Raavi"/>
+        <a:font script="Cans" typeface="Euphemia"/>
+        <a:font script="Cher" typeface="Plantagenet Cherokee"/>
+        <a:font script="Yiii" typeface="Microsoft Yi Baiti"/>
+        <a:font script="Tibt" typeface="Microsoft Himalaya"/>
+        <a:font script="Thaa" typeface="MV Boli"/>
+        <a:font script="Deva" typeface="Mangal"/>
+        <a:font script="Telu" typeface="Gautami"/>
+        <a:font script="Taml" typeface="Latha"/>
+        <a:font script="Syrc" typeface="Estrangelo Edessa"/>
+        <a:font script="Orya" typeface="Kalinga"/>
+        <a:font script="Mlym" typeface="Kartika"/>
+        <a:font script="Laoo" typeface="DokChampa"/>
+        <a:font script="Sinh" typeface="Iskoola Pota"/>
+        <a:font script="Mong" typeface="Mongolian Baiti"/>
+        <a:font script="Viet" typeface="Times New Roman"/>
+        <a:font script="Uigh" typeface="Microsoft Uighur"/>
+        <a:font script="Geor" typeface="Sylfaen"/>
+      </a:majorFont>
+      <a:minorFont>
+        <a:latin typeface="Calibri"/>
+        <a:ea typeface=""/>
+        <a:cs typeface=""/>
+        <a:font script="Jpan" typeface="ＭＳ Ｐゴシック"/>
+        <a:font script="Hang" typeface="맑은 고딕"/>
+        <a:font script="Hans" typeface="宋体"/>
+        <a:font script="Hant" typeface="新細明體"/>
+        <a:font script="Arab" typeface="Arial"/>
+        <a:font script="Hebr" typeface="Arial"/>
+        <a:font script="Thai" typeface="Cordia New"/>
+        <a:font script="Ethi" typeface="Nyala"/>
+        <a:font script="Beng" typeface="Vrinda"/>
+        <a:font script="Gujr" typeface="Shruti"/>
+        <a:font script="Khmr" typeface="DaunPenh"/>
+        <a:font script="Knda" typeface="Tunga"/>
+        <a:font script="Guru" typeface="Raavi"/>
+        <a:font script="Cans" typeface="Euphemia"/>
+        <a:font script="Cher" typeface="Plantagenet Cherokee"/>
+        <a:font script="Yiii" typeface="Microsoft Yi Baiti"/>
+        <a:font script="Tibt" typeface="Microsoft Himalaya"/>
+        <a:font script="Thaa" typeface="MV Boli"/>
+        <a:font script="Deva" typeface="Mangal"/>
+        <a:font script="Telu" typeface="Gautami"/>
+        <a:font script="Taml" typeface="Latha"/>
+        <a:font script="Syrc" typeface="Estrangelo Edessa"/>
+        <a:font script="Orya" typeface="Kalinga"/>
+        <a:font script="Mlym" typeface="Kartika"/>
+        <a:font script="Laoo" typeface="DokChampa"/>
+        <a:font script="Sinh" typeface="Iskoola Pota"/>
+        <a:font script="Mong" typeface="Mongolian Baiti"/>
+        <a:font script="Viet" typeface="Arial"/>
+        <a:font script="Uigh" typeface="Microsoft Uighur"/>
+        <a:font script="Geor" typeface="Sylfaen"/>
+      </a:minorFont>
+    </a:fontScheme>
+    <a:fmtScheme name="Office">
+      <a:fillStyleLst>
+        <a:solidFill>
+          <a:schemeClr val="phClr"/>
+        </a:solidFill>
+        <a:gradFill rotWithShape="1">
+          <a:gsLst>
+            <a:gs pos="0">
+              <a:schemeClr val="phClr">
+                <a:tint val="50000"/>
+                <a:satMod val="300000"/>
+              </a:schemeClr>
+            </a:gs>
+            <a:gs pos="35000">
+              <a:schemeClr val="phClr">
+                <a:tint val="37000"/>
+                <a:satMod val="300000"/>
+              </a:schemeClr>
+            </a:gs>
+            <a:gs pos="100000">
+              <a:schemeClr val="phClr">
+                <a:tint val="15000"/>
+                <a:satMod val="350000"/>
+              </a:schemeClr>
+            </a:gs>
+          </a:gsLst>
+          <a:lin ang="16200000" scaled="1"/>
+        </a:gradFill>
+        <a:gradFill rotWithShape="1">
+          <a:gsLst>
+            <a:gs pos="0">
+              <a:schemeClr val="phClr">
+                <a:shade val="51000"/>
+                <a:satMod val="130000"/>
+              </a:schemeClr>
+            </a:gs>
+            <a:gs pos="80000">
+              <a:schemeClr val="phClr">
+                <a:shade val="93000"/>
+                <a:satMod val="130000"/>
+              </a:schemeClr>
+            </a:gs>
+            <a:gs pos="100000">
+              <a:schemeClr val="phClr">
+                <a:shade val="94000"/>
+                <a:satMod val="135000"/>
+              </a:schemeClr>
+            </a:gs>
+          </a:gsLst>
+          <a:lin ang="16200000" scaled="0"/>
+        </a:gradFill>
+      </a:fillStyleLst>
+      <a:lnStyleLst>
+        <a:ln w="9525" cap="flat" cmpd="sng" algn="ctr">
+          <a:solidFill>
+            <a:schemeClr val="phClr">
+              <a:shade val="95000"/>
+              <a:satMod val="105000"/>
+            </a:schemeClr>
+          </a:solidFill>
+          <a:prstDash val="solid"/>
+        </a:ln>
+        <a:ln w="25400" cap="flat" cmpd="sng" algn="ctr">
+          <a:solidFill>
+            <a:schemeClr val="phClr"/>
+          </a:solidFill>
+          <a:prstDash val="solid"/>
+        </a:ln>
+        <a:ln w="38100" cap="flat" cmpd="sng" algn="ctr">
+          <a:solidFill>
+            <a:schemeClr val="phClr"/>
+          </a:solidFill>
+          <a:prstDash val="solid"/>
+        </a:ln>
+      </a:lnStyleLst>
+      <a:effectStyleLst>
+        <a:effectStyle>
+          <a:effectLst>
+            <a:outerShdw blurRad="40000" dist="20000" dir="5400000" rotWithShape="0">
+              <a:srgbClr val="000000">
+                <a:alpha val="38000"/>
+              </a:srgbClr>
+            </a:outerShdw>
+          </a:effectLst>
+        </a:effectStyle>
+        <a:effectStyle>
+          <a:effectLst>
+            <a:outerShdw blurRad="40000" dist="23000" dir="5400000" rotWithShape="0">
+              <a:srgbClr val="000000">
+                <a:alpha val="35000"/>
+              </a:srgbClr>
+            </a:outerShdw>
+          </a:effectLst>
+        </a:effectStyle>
+        <a:effectStyle>
+          <a:effectLst>
+            <a:outerShdw blurRad="40000" dist="23000" dir="5400000" rotWithShape="0">
+              <a:srgbClr val="000000">
+                <a:alpha val="35000"/>
+              </a:srgbClr>
+            </a:outerShdw>
+          </a:effectLst>
+          <a:scene3d>
+            <a:camera prst="orthographicFront">
+              <a:rot lat="0" lon="0" rev="0"/>
+            </a:camera>
+            <a:lightRig rig="threePt" dir="t">
+              <a:rot lat="0" lon="0" rev="1200000"/>
+            </a:lightRig>
+          </a:scene3d>
+          <a:sp3d>
+            <a:bevelT w="63500" h="25400"/>
+          </a:sp3d>
+        </a:effectStyle>
+      </a:effectStyleLst>
+      <a:bgFillStyleLst>
+        <a:solidFill>
+          <a:schemeClr val="phClr"/>
+        </a:solidFill>
+        <a:gradFill rotWithShape="1">
+          <a:gsLst>
+            <a:gs pos="0">
+              <a:schemeClr val="phClr">
+                <a:tint val="40000"/>
+                <a:satMod val="350000"/>
+              </a:schemeClr>
+            </a:gs>
+            <a:gs pos="40000">
+              <a:schemeClr val="phClr">
+                <a:tint val="45000"/>
+                <a:shade val="99000"/>
+                <a:satMod val="350000"/>
+              </a:schemeClr>
+            </a:gs>
+            <a:gs pos="100000">
+              <a:schemeClr val="phClr">
+                <a:shade val="20000"/>
+                <a:satMod val="255000"/>
+              </a:schemeClr>
+            </a:gs>
+          </a:gsLst>
+          <a:path path="circle">
+            <a:fillToRect l="50000" t="-80000" r="50000" b="180000"/>
+          </a:path>
+        </a:gradFill>
+        <a:gradFill rotWithShape="1">
+          <a:gsLst>
+            <a:gs pos="0">
+              <a:schemeClr val="phClr">
+                <a:tint val="80000"/>
+                <a:satMod val="300000"/>
+              </a:schemeClr>
+            </a:gs>
+            <a:gs pos="100000">
+              <a:schemeClr val="phClr">
+                <a:shade val="30000"/>
+                <a:satMod val="200000"/>
+              </a:schemeClr>
+            </a:gs>
+          </a:gsLst>
+          <a:path path="circle">
+            <a:fillToRect l="50000" t="50000" r="50000" b="50000"/>
+          </a:path>
+        </a:gradFill>
+      </a:bgFillStyleLst>
+    </a:fmtScheme>
+  </a:themeElements>
+  <a:objectDefaults/>
+  <a:extraClrSchemeLst/>
+</a:theme>
 </file>
</xml_diff>